<commit_message>
added green cab cost model
</commit_message>
<xml_diff>
--- a/W205-TaxiNYC-FinalPresentation-JB-RN-AP.pptx
+++ b/W205-TaxiNYC-FinalPresentation-JB-RN-AP.pptx
@@ -21,7 +21,7 @@
     <p:sldId id="274" r:id="rId12"/>
     <p:sldId id="259" r:id="rId13"/>
     <p:sldId id="260" r:id="rId14"/>
-    <p:sldId id="282" r:id="rId15"/>
+    <p:sldId id="290" r:id="rId15"/>
     <p:sldId id="265" r:id="rId16"/>
   </p:sldIdLst>
   <p:sldSz cx="9144000" cy="5143500" type="screen16x9"/>
@@ -710,7 +710,7 @@
       </p:grpSpPr>
       <p:sp>
         <p:nvSpPr>
-          <p:cNvPr id="29698" name="Shape 168"/>
+          <p:cNvPr id="27650" name="Shape 118"/>
           <p:cNvSpPr txBox="1">
             <a:spLocks noGrp="1"/>
           </p:cNvSpPr>
@@ -759,7 +759,7 @@
       </p:sp>
       <p:sp>
         <p:nvSpPr>
-          <p:cNvPr id="29699" name="Shape 169"/>
+          <p:cNvPr id="27651" name="Shape 119"/>
           <p:cNvSpPr>
             <a:spLocks noGrp="1" noRot="1" noChangeAspect="1" noTextEdit="1"/>
           </p:cNvSpPr>
@@ -778,7 +778,7 @@
     </p:spTree>
     <p:extLst>
       <p:ext uri="{BB962C8B-B14F-4D97-AF65-F5344CB8AC3E}">
-        <p14:creationId xmlns:p14="http://schemas.microsoft.com/office/powerpoint/2010/main" val="2936953171"/>
+        <p14:creationId xmlns:p14="http://schemas.microsoft.com/office/powerpoint/2010/main" val="660415263"/>
       </p:ext>
     </p:extLst>
   </p:cSld>
@@ -13467,7 +13467,7 @@
       </p:grpSpPr>
       <p:sp>
         <p:nvSpPr>
-          <p:cNvPr id="28674" name="Shape 171"/>
+          <p:cNvPr id="26626" name="Shape 121"/>
           <p:cNvSpPr>
             <a:spLocks noChangeArrowheads="1"/>
           </p:cNvSpPr>
@@ -13619,7 +13619,7 @@
       </p:sp>
       <p:sp>
         <p:nvSpPr>
-          <p:cNvPr id="28675" name="Shape 172"/>
+          <p:cNvPr id="26627" name="Shape 122"/>
           <p:cNvSpPr txBox="1">
             <a:spLocks noGrp="1"/>
           </p:cNvSpPr>
@@ -13656,2086 +13656,43 @@
                 <a:solidFill>
                   <a:srgbClr val="FFFFFF"/>
                 </a:solidFill>
-                <a:latin typeface="Helvetica Neue" charset="0"/>
+                <a:latin typeface="+mj-lt"/>
                 <a:cs typeface="Helvetica Neue" charset="0"/>
                 <a:sym typeface="Helvetica Neue" charset="0"/>
               </a:rPr>
-              <a:t>Data Flow</a:t>
+              <a:t>Training the Prediction Model</a:t>
             </a:r>
           </a:p>
         </p:txBody>
       </p:sp>
-      <p:sp>
-        <p:nvSpPr>
-          <p:cNvPr id="6" name="Rectangle 5"/>
-          <p:cNvSpPr/>
+      <p:pic>
+        <p:nvPicPr>
+          <p:cNvPr id="16" name="Picture 15"/>
+          <p:cNvPicPr>
+            <a:picLocks noChangeAspect="1"/>
+          </p:cNvPicPr>
           <p:nvPr/>
-        </p:nvSpPr>
+        </p:nvPicPr>
+        <p:blipFill>
+          <a:blip r:embed="rId3"/>
+          <a:stretch>
+            <a:fillRect/>
+          </a:stretch>
+        </p:blipFill>
         <p:spPr>
           <a:xfrm>
-            <a:off x="334368" y="763558"/>
-            <a:ext cx="1538124" cy="230832"/>
+            <a:off x="990599" y="891536"/>
+            <a:ext cx="7516091" cy="4176401"/>
           </a:xfrm>
           <a:prstGeom prst="rect">
             <a:avLst/>
           </a:prstGeom>
         </p:spPr>
-        <p:txBody>
-          <a:bodyPr wrap="square">
-            <a:spAutoFit/>
-          </a:bodyPr>
-          <a:lstStyle/>
-          <a:p>
-            <a:pPr algn="ctr"/>
-            <a:r>
-              <a:rPr lang="en-US" sz="900" b="1" dirty="0"/>
-              <a:t>Rides (yellow and green)</a:t>
-            </a:r>
-          </a:p>
-        </p:txBody>
-      </p:sp>
-      <p:graphicFrame>
-        <p:nvGraphicFramePr>
-          <p:cNvPr id="7" name="Table 6"/>
-          <p:cNvGraphicFramePr>
-            <a:graphicFrameLocks noGrp="1"/>
-          </p:cNvGraphicFramePr>
-          <p:nvPr>
-            <p:extLst>
-              <p:ext uri="{D42A27DB-BD31-4B8C-83A1-F6EECF244321}">
-                <p14:modId xmlns:p14="http://schemas.microsoft.com/office/powerpoint/2010/main" val="4008102284"/>
-              </p:ext>
-            </p:extLst>
-          </p:nvPr>
-        </p:nvGraphicFramePr>
-        <p:xfrm>
-          <a:off x="342514" y="966381"/>
-          <a:ext cx="1529980" cy="1600200"/>
-        </p:xfrm>
-        <a:graphic>
-          <a:graphicData uri="http://schemas.openxmlformats.org/drawingml/2006/table">
-            <a:tbl>
-              <a:tblPr bandRow="1">
-                <a:tableStyleId>{5C22544A-7EE6-4342-B048-85BDC9FD1C3A}</a:tableStyleId>
-              </a:tblPr>
-              <a:tblGrid>
-                <a:gridCol w="1003946">
-                  <a:extLst>
-                    <a:ext uri="{9D8B030D-6E8A-4147-A177-3AD203B41FA5}">
-                      <a16:colId xmlns:a16="http://schemas.microsoft.com/office/drawing/2014/main" val="2146396053"/>
-                    </a:ext>
-                  </a:extLst>
-                </a:gridCol>
-                <a:gridCol w="526034">
-                  <a:extLst>
-                    <a:ext uri="{9D8B030D-6E8A-4147-A177-3AD203B41FA5}">
-                      <a16:colId xmlns:a16="http://schemas.microsoft.com/office/drawing/2014/main" val="872119490"/>
-                    </a:ext>
-                  </a:extLst>
-                </a:gridCol>
-              </a:tblGrid>
-              <a:tr h="190500">
-                <a:tc>
-                  <a:txBody>
-                    <a:bodyPr/>
-                    <a:lstStyle/>
-                    <a:p>
-                      <a:endParaRPr lang="en-US" sz="800" b="0" i="1" dirty="0"/>
-                    </a:p>
-                  </a:txBody>
-                  <a:tcPr marL="68580" marR="68580" marT="34290" marB="34290"/>
-                </a:tc>
-                <a:tc>
-                  <a:txBody>
-                    <a:bodyPr/>
-                    <a:lstStyle/>
-                    <a:p>
-                      <a:endParaRPr lang="en-US" sz="800" b="0" i="1" dirty="0"/>
-                    </a:p>
-                  </a:txBody>
-                  <a:tcPr marL="68580" marR="68580" marT="34290" marB="34290"/>
-                </a:tc>
-                <a:extLst>
-                  <a:ext uri="{0D108BD9-81ED-4DB2-BD59-A6C34878D82A}">
-                    <a16:rowId xmlns:a16="http://schemas.microsoft.com/office/drawing/2014/main" val="2385345212"/>
-                  </a:ext>
-                </a:extLst>
-              </a:tr>
-              <a:tr h="1409700">
-                <a:tc>
-                  <a:txBody>
-                    <a:bodyPr/>
-                    <a:lstStyle/>
-                    <a:p>
-                      <a:r>
-                        <a:rPr lang="en-US" sz="800" dirty="0"/>
-                        <a:t>ride_source</a:t>
-                      </a:r>
-                    </a:p>
-                    <a:p>
-                      <a:r>
-                        <a:rPr lang="en-US" sz="800" dirty="0"/>
-                        <a:t>passenger_count</a:t>
-                      </a:r>
-                    </a:p>
-                    <a:p>
-                      <a:r>
-                        <a:rPr lang="en-US" sz="800" dirty="0"/>
-                        <a:t>pickup</a:t>
-                      </a:r>
-                      <a:r>
-                        <a:rPr lang="en-US" sz="800" baseline="0" dirty="0"/>
-                        <a:t>_</a:t>
-                      </a:r>
-                      <a:r>
-                        <a:rPr lang="en-US" sz="800" dirty="0"/>
-                        <a:t>longitude</a:t>
-                      </a:r>
-                    </a:p>
-                    <a:p>
-                      <a:r>
-                        <a:rPr lang="en-US" sz="800" dirty="0"/>
-                        <a:t>pickup</a:t>
-                      </a:r>
-                      <a:r>
-                        <a:rPr lang="en-US" sz="800" baseline="0" dirty="0"/>
-                        <a:t>_</a:t>
-                      </a:r>
-                      <a:r>
-                        <a:rPr lang="en-US" sz="800" dirty="0"/>
-                        <a:t>latitude</a:t>
-                      </a:r>
-                    </a:p>
-                    <a:p>
-                      <a:r>
-                        <a:rPr lang="en-US" sz="800" dirty="0"/>
-                        <a:t>Pickup_year</a:t>
-                      </a:r>
-                    </a:p>
-                    <a:p>
-                      <a:r>
-                        <a:rPr lang="en-US" sz="800" dirty="0"/>
-                        <a:t>Pickup_month</a:t>
-                      </a:r>
-                    </a:p>
-                    <a:p>
-                      <a:r>
-                        <a:rPr lang="en-US" sz="800" dirty="0"/>
-                        <a:t>Pickup_day</a:t>
-                      </a:r>
-                    </a:p>
-                    <a:p>
-                      <a:r>
-                        <a:rPr lang="en-US" sz="800" dirty="0"/>
-                        <a:t>Pickup_hour</a:t>
-                      </a:r>
-                    </a:p>
-                    <a:p>
-                      <a:r>
-                        <a:rPr lang="en-US" sz="800" dirty="0"/>
-                        <a:t>Pickup_dayofweek</a:t>
-                      </a:r>
-                    </a:p>
-                    <a:p>
-                      <a:r>
-                        <a:rPr lang="en-US" sz="800" dirty="0"/>
-                        <a:t>Pickup_week</a:t>
-                      </a:r>
-                    </a:p>
-                    <a:p>
-                      <a:r>
-                        <a:rPr lang="en-US" sz="800" dirty="0"/>
-                        <a:t>Ride_count</a:t>
-                      </a:r>
-                    </a:p>
-                  </a:txBody>
-                  <a:tcPr marL="68580" marR="68580" marT="34290" marB="34290"/>
-                </a:tc>
-                <a:tc>
-                  <a:txBody>
-                    <a:bodyPr/>
-                    <a:lstStyle/>
-                    <a:p>
-                      <a:r>
-                        <a:rPr lang="en-US" sz="800" dirty="0"/>
-                        <a:t>string</a:t>
-                      </a:r>
-                    </a:p>
-                    <a:p>
-                      <a:r>
-                        <a:rPr lang="en-US" sz="800" dirty="0"/>
-                        <a:t>int</a:t>
-                      </a:r>
-                    </a:p>
-                    <a:p>
-                      <a:r>
-                        <a:rPr lang="en-US" sz="800" dirty="0"/>
-                        <a:t>decimal</a:t>
-                      </a:r>
-                    </a:p>
-                    <a:p>
-                      <a:pPr marL="0" marR="0" lvl="0" indent="0" algn="l" defTabSz="914400" rtl="0" eaLnBrk="1" fontAlgn="auto" latinLnBrk="0" hangingPunct="1">
-                        <a:lnSpc>
-                          <a:spcPct val="100000"/>
-                        </a:lnSpc>
-                        <a:spcBef>
-                          <a:spcPts val="0"/>
-                        </a:spcBef>
-                        <a:spcAft>
-                          <a:spcPts val="0"/>
-                        </a:spcAft>
-                        <a:buClrTx/>
-                        <a:buSzTx/>
-                        <a:buFontTx/>
-                        <a:buNone/>
-                        <a:tabLst/>
-                        <a:defRPr/>
-                      </a:pPr>
-                      <a:r>
-                        <a:rPr lang="en-US" sz="800" dirty="0"/>
-                        <a:t>decimal</a:t>
-                      </a:r>
-                    </a:p>
-                    <a:p>
-                      <a:r>
-                        <a:rPr lang="en-US" sz="800" dirty="0"/>
-                        <a:t>Int</a:t>
-                      </a:r>
-                    </a:p>
-                    <a:p>
-                      <a:r>
-                        <a:rPr lang="en-US" sz="800" dirty="0"/>
-                        <a:t>Int</a:t>
-                      </a:r>
-                    </a:p>
-                    <a:p>
-                      <a:r>
-                        <a:rPr lang="en-US" sz="800" dirty="0"/>
-                        <a:t>Int</a:t>
-                      </a:r>
-                    </a:p>
-                    <a:p>
-                      <a:r>
-                        <a:rPr lang="en-US" sz="800" dirty="0"/>
-                        <a:t>Int</a:t>
-                      </a:r>
-                    </a:p>
-                    <a:p>
-                      <a:r>
-                        <a:rPr lang="en-US" sz="800" dirty="0"/>
-                        <a:t>Int</a:t>
-                      </a:r>
-                    </a:p>
-                    <a:p>
-                      <a:r>
-                        <a:rPr lang="en-US" sz="800" dirty="0"/>
-                        <a:t>Int</a:t>
-                      </a:r>
-                    </a:p>
-                    <a:p>
-                      <a:r>
-                        <a:rPr lang="en-US" sz="800" dirty="0"/>
-                        <a:t>Big int</a:t>
-                      </a:r>
-                    </a:p>
-                  </a:txBody>
-                  <a:tcPr marL="68580" marR="68580" marT="34290" marB="34290"/>
-                </a:tc>
-                <a:extLst>
-                  <a:ext uri="{0D108BD9-81ED-4DB2-BD59-A6C34878D82A}">
-                    <a16:rowId xmlns:a16="http://schemas.microsoft.com/office/drawing/2014/main" val="973132991"/>
-                  </a:ext>
-                </a:extLst>
-              </a:tr>
-            </a:tbl>
-          </a:graphicData>
-        </a:graphic>
-      </p:graphicFrame>
-      <p:sp>
-        <p:nvSpPr>
-          <p:cNvPr id="8" name="Rectangle 7"/>
-          <p:cNvSpPr/>
-          <p:nvPr/>
-        </p:nvSpPr>
-        <p:spPr>
-          <a:xfrm>
-            <a:off x="4855301" y="2345572"/>
-            <a:ext cx="1319076" cy="230832"/>
-          </a:xfrm>
-          <a:prstGeom prst="rect">
-            <a:avLst/>
-          </a:prstGeom>
-        </p:spPr>
-        <p:txBody>
-          <a:bodyPr wrap="square">
-            <a:spAutoFit/>
-          </a:bodyPr>
-          <a:lstStyle/>
-          <a:p>
-            <a:pPr algn="ctr"/>
-            <a:r>
-              <a:rPr lang="en-US" sz="900" b="1" dirty="0">
-                <a:latin typeface="+mj-lt"/>
-              </a:rPr>
-              <a:t>weather</a:t>
-            </a:r>
-          </a:p>
-        </p:txBody>
-      </p:sp>
-      <p:graphicFrame>
-        <p:nvGraphicFramePr>
-          <p:cNvPr id="9" name="Table 8"/>
-          <p:cNvGraphicFramePr>
-            <a:graphicFrameLocks noGrp="1"/>
-          </p:cNvGraphicFramePr>
-          <p:nvPr>
-            <p:extLst>
-              <p:ext uri="{D42A27DB-BD31-4B8C-83A1-F6EECF244321}">
-                <p14:modId xmlns:p14="http://schemas.microsoft.com/office/powerpoint/2010/main" val="1798646784"/>
-              </p:ext>
-            </p:extLst>
-          </p:nvPr>
-        </p:nvGraphicFramePr>
-        <p:xfrm>
-          <a:off x="4863017" y="2553321"/>
-          <a:ext cx="1319076" cy="1356360"/>
-        </p:xfrm>
-        <a:graphic>
-          <a:graphicData uri="http://schemas.openxmlformats.org/drawingml/2006/table">
-            <a:tbl>
-              <a:tblPr bandRow="1">
-                <a:tableStyleId>{5C22544A-7EE6-4342-B048-85BDC9FD1C3A}</a:tableStyleId>
-              </a:tblPr>
-              <a:tblGrid>
-                <a:gridCol w="855710">
-                  <a:extLst>
-                    <a:ext uri="{9D8B030D-6E8A-4147-A177-3AD203B41FA5}">
-                      <a16:colId xmlns:a16="http://schemas.microsoft.com/office/drawing/2014/main" val="2146396053"/>
-                    </a:ext>
-                  </a:extLst>
-                </a:gridCol>
-                <a:gridCol w="463366">
-                  <a:extLst>
-                    <a:ext uri="{9D8B030D-6E8A-4147-A177-3AD203B41FA5}">
-                      <a16:colId xmlns:a16="http://schemas.microsoft.com/office/drawing/2014/main" val="872119490"/>
-                    </a:ext>
-                  </a:extLst>
-                </a:gridCol>
-              </a:tblGrid>
-              <a:tr h="190500">
-                <a:tc>
-                  <a:txBody>
-                    <a:bodyPr/>
-                    <a:lstStyle/>
-                    <a:p>
-                      <a:r>
-                        <a:rPr lang="en-US" sz="800" b="0" i="1" dirty="0"/>
-                        <a:t>weather_id (pk) </a:t>
-                      </a:r>
-                    </a:p>
-                  </a:txBody>
-                  <a:tcPr marL="68580" marR="68580" marT="34290" marB="34290"/>
-                </a:tc>
-                <a:tc>
-                  <a:txBody>
-                    <a:bodyPr/>
-                    <a:lstStyle/>
-                    <a:p>
-                      <a:r>
-                        <a:rPr lang="en-US" sz="800" b="0" i="1" dirty="0"/>
-                        <a:t>int</a:t>
-                      </a:r>
-                    </a:p>
-                  </a:txBody>
-                  <a:tcPr marL="68580" marR="68580" marT="34290" marB="34290"/>
-                </a:tc>
-                <a:extLst>
-                  <a:ext uri="{0D108BD9-81ED-4DB2-BD59-A6C34878D82A}">
-                    <a16:rowId xmlns:a16="http://schemas.microsoft.com/office/drawing/2014/main" val="2385345212"/>
-                  </a:ext>
-                </a:extLst>
-              </a:tr>
-              <a:tr h="1165860">
-                <a:tc>
-                  <a:txBody>
-                    <a:bodyPr/>
-                    <a:lstStyle/>
-                    <a:p>
-                      <a:r>
-                        <a:rPr lang="en-US" sz="800" dirty="0"/>
-                        <a:t>recorded_time</a:t>
-                      </a:r>
-                    </a:p>
-                    <a:p>
-                      <a:r>
-                        <a:rPr lang="en-US" sz="800" dirty="0"/>
-                        <a:t>Precipitation</a:t>
-                      </a:r>
-                    </a:p>
-                    <a:p>
-                      <a:r>
-                        <a:rPr lang="en-US" sz="800" dirty="0"/>
-                        <a:t>Snow</a:t>
-                      </a:r>
-                    </a:p>
-                    <a:p>
-                      <a:r>
-                        <a:rPr lang="en-US" sz="800" dirty="0"/>
-                        <a:t>Maximum</a:t>
-                      </a:r>
-                      <a:r>
-                        <a:rPr lang="en-US" sz="800" baseline="0" dirty="0"/>
-                        <a:t> Temp</a:t>
-                      </a:r>
-                    </a:p>
-                    <a:p>
-                      <a:r>
-                        <a:rPr lang="en-US" sz="800" baseline="0" dirty="0"/>
-                        <a:t>Minimum Temp</a:t>
-                      </a:r>
-                      <a:endParaRPr lang="en-US" sz="800" dirty="0"/>
-                    </a:p>
-                  </a:txBody>
-                  <a:tcPr marL="68580" marR="68580" marT="34290" marB="34290"/>
-                </a:tc>
-                <a:tc>
-                  <a:txBody>
-                    <a:bodyPr/>
-                    <a:lstStyle/>
-                    <a:p>
-                      <a:r>
-                        <a:rPr lang="en-US" sz="800" dirty="0"/>
-                        <a:t>Date</a:t>
-                      </a:r>
-                    </a:p>
-                    <a:p>
-                      <a:r>
-                        <a:rPr lang="en-US" sz="800" dirty="0"/>
-                        <a:t>decimal</a:t>
-                      </a:r>
-                    </a:p>
-                    <a:p>
-                      <a:r>
-                        <a:rPr lang="en-US" sz="800" dirty="0"/>
-                        <a:t>decimal</a:t>
-                      </a:r>
-                    </a:p>
-                    <a:p>
-                      <a:r>
-                        <a:rPr lang="en-US" sz="800" dirty="0"/>
-                        <a:t>decimal</a:t>
-                      </a:r>
-                    </a:p>
-                    <a:p>
-                      <a:pPr marL="0" marR="0" lvl="0" indent="0" algn="l" defTabSz="914400" rtl="0" eaLnBrk="1" fontAlgn="auto" latinLnBrk="0" hangingPunct="1">
-                        <a:lnSpc>
-                          <a:spcPct val="100000"/>
-                        </a:lnSpc>
-                        <a:spcBef>
-                          <a:spcPts val="0"/>
-                        </a:spcBef>
-                        <a:spcAft>
-                          <a:spcPts val="0"/>
-                        </a:spcAft>
-                        <a:buClrTx/>
-                        <a:buSzTx/>
-                        <a:buFontTx/>
-                        <a:buNone/>
-                        <a:tabLst/>
-                        <a:defRPr/>
-                      </a:pPr>
-                      <a:r>
-                        <a:rPr lang="en-US" sz="800" dirty="0"/>
-                        <a:t>decimal</a:t>
-                      </a:r>
-                    </a:p>
-                  </a:txBody>
-                  <a:tcPr marL="68580" marR="68580" marT="34290" marB="34290"/>
-                </a:tc>
-                <a:extLst>
-                  <a:ext uri="{0D108BD9-81ED-4DB2-BD59-A6C34878D82A}">
-                    <a16:rowId xmlns:a16="http://schemas.microsoft.com/office/drawing/2014/main" val="973132991"/>
-                  </a:ext>
-                </a:extLst>
-              </a:tr>
-            </a:tbl>
-          </a:graphicData>
-        </a:graphic>
-      </p:graphicFrame>
-      <p:graphicFrame>
-        <p:nvGraphicFramePr>
-          <p:cNvPr id="10" name="Table 9"/>
-          <p:cNvGraphicFramePr>
-            <a:graphicFrameLocks noGrp="1"/>
-          </p:cNvGraphicFramePr>
-          <p:nvPr>
-            <p:extLst>
-              <p:ext uri="{D42A27DB-BD31-4B8C-83A1-F6EECF244321}">
-                <p14:modId xmlns:p14="http://schemas.microsoft.com/office/powerpoint/2010/main" val="3824791364"/>
-              </p:ext>
-            </p:extLst>
-          </p:nvPr>
-        </p:nvGraphicFramePr>
-        <p:xfrm>
-          <a:off x="6922961" y="2023985"/>
-          <a:ext cx="1721966" cy="1859280"/>
-        </p:xfrm>
-        <a:graphic>
-          <a:graphicData uri="http://schemas.openxmlformats.org/drawingml/2006/table">
-            <a:tbl>
-              <a:tblPr bandRow="1">
-                <a:tableStyleId>{5C22544A-7EE6-4342-B048-85BDC9FD1C3A}</a:tableStyleId>
-              </a:tblPr>
-              <a:tblGrid>
-                <a:gridCol w="1184138">
-                  <a:extLst>
-                    <a:ext uri="{9D8B030D-6E8A-4147-A177-3AD203B41FA5}">
-                      <a16:colId xmlns:a16="http://schemas.microsoft.com/office/drawing/2014/main" val="2146396053"/>
-                    </a:ext>
-                  </a:extLst>
-                </a:gridCol>
-                <a:gridCol w="537828">
-                  <a:extLst>
-                    <a:ext uri="{9D8B030D-6E8A-4147-A177-3AD203B41FA5}">
-                      <a16:colId xmlns:a16="http://schemas.microsoft.com/office/drawing/2014/main" val="872119490"/>
-                    </a:ext>
-                  </a:extLst>
-                </a:gridCol>
-              </a:tblGrid>
-              <a:tr h="190500">
-                <a:tc>
-                  <a:txBody>
-                    <a:bodyPr/>
-                    <a:lstStyle/>
-                    <a:p>
-                      <a:endParaRPr lang="en-US" sz="800" b="0" i="1" dirty="0"/>
-                    </a:p>
-                  </a:txBody>
-                  <a:tcPr marL="68580" marR="68580" marT="34290" marB="34290">
-                    <a:solidFill>
-                      <a:schemeClr val="accent6"/>
-                    </a:solidFill>
-                  </a:tcPr>
-                </a:tc>
-                <a:tc>
-                  <a:txBody>
-                    <a:bodyPr/>
-                    <a:lstStyle/>
-                    <a:p>
-                      <a:endParaRPr lang="en-US" sz="800" b="0" i="1" dirty="0"/>
-                    </a:p>
-                  </a:txBody>
-                  <a:tcPr marL="68580" marR="68580" marT="34290" marB="34290">
-                    <a:solidFill>
-                      <a:schemeClr val="accent6"/>
-                    </a:solidFill>
-                  </a:tcPr>
-                </a:tc>
-                <a:extLst>
-                  <a:ext uri="{0D108BD9-81ED-4DB2-BD59-A6C34878D82A}">
-                    <a16:rowId xmlns:a16="http://schemas.microsoft.com/office/drawing/2014/main" val="2385345212"/>
-                  </a:ext>
-                </a:extLst>
-              </a:tr>
-              <a:tr h="1668780">
-                <a:tc>
-                  <a:txBody>
-                    <a:bodyPr/>
-                    <a:lstStyle/>
-                    <a:p>
-                      <a:r>
-                        <a:rPr lang="en-US" sz="800" dirty="0"/>
-                        <a:t>ride_source</a:t>
-                      </a:r>
-                    </a:p>
-                    <a:p>
-                      <a:r>
-                        <a:rPr lang="en-US" sz="800" dirty="0"/>
-                        <a:t>passenger_count</a:t>
-                      </a:r>
-                    </a:p>
-                    <a:p>
-                      <a:r>
-                        <a:rPr lang="en-US" sz="800" dirty="0"/>
-                        <a:t>Pickup_zipcode</a:t>
-                      </a:r>
-                    </a:p>
-                    <a:p>
-                      <a:r>
-                        <a:rPr lang="en-US" sz="800" dirty="0"/>
-                        <a:t>Pickup_borough</a:t>
-                      </a:r>
-                    </a:p>
-                    <a:p>
-                      <a:r>
-                        <a:rPr lang="en-US" sz="800" dirty="0"/>
-                        <a:t>Pickup_year</a:t>
-                      </a:r>
-                    </a:p>
-                    <a:p>
-                      <a:r>
-                        <a:rPr lang="en-US" sz="800" dirty="0"/>
-                        <a:t>Pickup_month</a:t>
-                      </a:r>
-                    </a:p>
-                    <a:p>
-                      <a:r>
-                        <a:rPr lang="en-US" sz="800" dirty="0"/>
-                        <a:t>Pickup_day</a:t>
-                      </a:r>
-                    </a:p>
-                    <a:p>
-                      <a:r>
-                        <a:rPr lang="en-US" sz="800" dirty="0"/>
-                        <a:t>Pickup_hour</a:t>
-                      </a:r>
-                    </a:p>
-                    <a:p>
-                      <a:r>
-                        <a:rPr lang="en-US" sz="800" dirty="0"/>
-                        <a:t>Ride_count</a:t>
-                      </a:r>
-                    </a:p>
-                    <a:p>
-                      <a:r>
-                        <a:rPr lang="en-US" sz="800" dirty="0"/>
-                        <a:t>Precipitation</a:t>
-                      </a:r>
-                    </a:p>
-                    <a:p>
-                      <a:r>
-                        <a:rPr lang="en-US" sz="800" dirty="0"/>
-                        <a:t>Snow</a:t>
-                      </a:r>
-                    </a:p>
-                    <a:p>
-                      <a:r>
-                        <a:rPr lang="en-US" sz="800" dirty="0"/>
-                        <a:t>Maximum</a:t>
-                      </a:r>
-                      <a:r>
-                        <a:rPr lang="en-US" sz="800" baseline="0" dirty="0"/>
-                        <a:t> Temp</a:t>
-                      </a:r>
-                    </a:p>
-                    <a:p>
-                      <a:r>
-                        <a:rPr lang="en-US" sz="800" baseline="0" dirty="0"/>
-                        <a:t>Minimum Temp</a:t>
-                      </a:r>
-                      <a:endParaRPr lang="en-US" sz="800" dirty="0"/>
-                    </a:p>
-                  </a:txBody>
-                  <a:tcPr marL="68580" marR="68580" marT="34290" marB="34290">
-                    <a:solidFill>
-                      <a:schemeClr val="accent6">
-                        <a:lumMod val="40000"/>
-                        <a:lumOff val="60000"/>
-                      </a:schemeClr>
-                    </a:solidFill>
-                  </a:tcPr>
-                </a:tc>
-                <a:tc>
-                  <a:txBody>
-                    <a:bodyPr/>
-                    <a:lstStyle/>
-                    <a:p>
-                      <a:r>
-                        <a:rPr lang="en-US" sz="800" dirty="0"/>
-                        <a:t>string</a:t>
-                      </a:r>
-                    </a:p>
-                    <a:p>
-                      <a:r>
-                        <a:rPr lang="en-US" sz="800" dirty="0"/>
-                        <a:t>Int</a:t>
-                      </a:r>
-                    </a:p>
-                    <a:p>
-                      <a:r>
-                        <a:rPr lang="en-US" sz="800" dirty="0"/>
-                        <a:t>String</a:t>
-                      </a:r>
-                    </a:p>
-                    <a:p>
-                      <a:r>
-                        <a:rPr lang="en-US" sz="800" dirty="0"/>
-                        <a:t>String</a:t>
-                      </a:r>
-                    </a:p>
-                    <a:p>
-                      <a:r>
-                        <a:rPr lang="en-US" sz="800" dirty="0"/>
-                        <a:t>Int</a:t>
-                      </a:r>
-                    </a:p>
-                    <a:p>
-                      <a:r>
-                        <a:rPr lang="en-US" sz="800" dirty="0"/>
-                        <a:t>Int</a:t>
-                      </a:r>
-                    </a:p>
-                    <a:p>
-                      <a:r>
-                        <a:rPr lang="en-US" sz="800" dirty="0"/>
-                        <a:t>Int</a:t>
-                      </a:r>
-                    </a:p>
-                    <a:p>
-                      <a:r>
-                        <a:rPr lang="en-US" sz="800" dirty="0"/>
-                        <a:t>Int</a:t>
-                      </a:r>
-                    </a:p>
-                    <a:p>
-                      <a:r>
-                        <a:rPr lang="en-US" sz="800" dirty="0"/>
-                        <a:t>Big Int</a:t>
-                      </a:r>
-                    </a:p>
-                    <a:p>
-                      <a:r>
-                        <a:rPr lang="en-US" sz="800" dirty="0"/>
-                        <a:t>Decimal</a:t>
-                      </a:r>
-                    </a:p>
-                    <a:p>
-                      <a:r>
-                        <a:rPr lang="en-US" sz="800" dirty="0"/>
-                        <a:t>Decimal</a:t>
-                      </a:r>
-                    </a:p>
-                    <a:p>
-                      <a:r>
-                        <a:rPr lang="en-US" sz="800" dirty="0"/>
-                        <a:t>Decimal</a:t>
-                      </a:r>
-                    </a:p>
-                    <a:p>
-                      <a:r>
-                        <a:rPr lang="en-US" sz="800" dirty="0"/>
-                        <a:t>Decimal</a:t>
-                      </a:r>
-                    </a:p>
-                  </a:txBody>
-                  <a:tcPr marL="68580" marR="68580" marT="34290" marB="34290">
-                    <a:solidFill>
-                      <a:schemeClr val="accent6">
-                        <a:lumMod val="40000"/>
-                        <a:lumOff val="60000"/>
-                      </a:schemeClr>
-                    </a:solidFill>
-                  </a:tcPr>
-                </a:tc>
-                <a:extLst>
-                  <a:ext uri="{0D108BD9-81ED-4DB2-BD59-A6C34878D82A}">
-                    <a16:rowId xmlns:a16="http://schemas.microsoft.com/office/drawing/2014/main" val="973132991"/>
-                  </a:ext>
-                </a:extLst>
-              </a:tr>
-            </a:tbl>
-          </a:graphicData>
-        </a:graphic>
-      </p:graphicFrame>
-      <p:sp>
-        <p:nvSpPr>
-          <p:cNvPr id="11" name="Rectangle 10"/>
-          <p:cNvSpPr/>
-          <p:nvPr/>
-        </p:nvSpPr>
-        <p:spPr>
-          <a:xfrm>
-            <a:off x="6922961" y="1797244"/>
-            <a:ext cx="1721966" cy="230832"/>
-          </a:xfrm>
-          <a:prstGeom prst="rect">
-            <a:avLst/>
-          </a:prstGeom>
-        </p:spPr>
-        <p:txBody>
-          <a:bodyPr wrap="square">
-            <a:spAutoFit/>
-          </a:bodyPr>
-          <a:lstStyle/>
-          <a:p>
-            <a:pPr algn="ctr"/>
-            <a:r>
-              <a:rPr lang="en-US" sz="900" b="1" dirty="0">
-                <a:latin typeface="+mj-lt"/>
-              </a:rPr>
-              <a:t>Rides Weather</a:t>
-            </a:r>
-          </a:p>
-        </p:txBody>
-      </p:sp>
-      <p:sp>
-        <p:nvSpPr>
-          <p:cNvPr id="12" name="Rectangle 11"/>
-          <p:cNvSpPr/>
-          <p:nvPr/>
-        </p:nvSpPr>
-        <p:spPr>
-          <a:xfrm>
-            <a:off x="2250253" y="867432"/>
-            <a:ext cx="1601817" cy="230832"/>
-          </a:xfrm>
-          <a:prstGeom prst="rect">
-            <a:avLst/>
-          </a:prstGeom>
-        </p:spPr>
-        <p:txBody>
-          <a:bodyPr wrap="square">
-            <a:spAutoFit/>
-          </a:bodyPr>
-          <a:lstStyle/>
-          <a:p>
-            <a:pPr algn="ctr"/>
-            <a:r>
-              <a:rPr lang="en-US" sz="900" b="1" dirty="0">
-                <a:latin typeface="+mj-lt"/>
-              </a:rPr>
-              <a:t>Hourly Rides by Zip</a:t>
-            </a:r>
-          </a:p>
-        </p:txBody>
-      </p:sp>
-      <p:graphicFrame>
-        <p:nvGraphicFramePr>
-          <p:cNvPr id="13" name="Table 12"/>
-          <p:cNvGraphicFramePr>
-            <a:graphicFrameLocks noGrp="1"/>
-          </p:cNvGraphicFramePr>
-          <p:nvPr>
-            <p:extLst>
-              <p:ext uri="{D42A27DB-BD31-4B8C-83A1-F6EECF244321}">
-                <p14:modId xmlns:p14="http://schemas.microsoft.com/office/powerpoint/2010/main" val="569489630"/>
-              </p:ext>
-            </p:extLst>
-          </p:nvPr>
-        </p:nvGraphicFramePr>
-        <p:xfrm>
-          <a:off x="2287004" y="1073978"/>
-          <a:ext cx="1565066" cy="1279489"/>
-        </p:xfrm>
-        <a:graphic>
-          <a:graphicData uri="http://schemas.openxmlformats.org/drawingml/2006/table">
-            <a:tbl>
-              <a:tblPr bandRow="1">
-                <a:tableStyleId>{5C22544A-7EE6-4342-B048-85BDC9FD1C3A}</a:tableStyleId>
-              </a:tblPr>
-              <a:tblGrid>
-                <a:gridCol w="1036421">
-                  <a:extLst>
-                    <a:ext uri="{9D8B030D-6E8A-4147-A177-3AD203B41FA5}">
-                      <a16:colId xmlns:a16="http://schemas.microsoft.com/office/drawing/2014/main" val="2146396053"/>
-                    </a:ext>
-                  </a:extLst>
-                </a:gridCol>
-                <a:gridCol w="528645">
-                  <a:extLst>
-                    <a:ext uri="{9D8B030D-6E8A-4147-A177-3AD203B41FA5}">
-                      <a16:colId xmlns:a16="http://schemas.microsoft.com/office/drawing/2014/main" val="872119490"/>
-                    </a:ext>
-                  </a:extLst>
-                </a:gridCol>
-              </a:tblGrid>
-              <a:tr h="190500">
-                <a:tc>
-                  <a:txBody>
-                    <a:bodyPr/>
-                    <a:lstStyle/>
-                    <a:p>
-                      <a:endParaRPr lang="en-US" sz="800" b="0" i="1" dirty="0"/>
-                    </a:p>
-                  </a:txBody>
-                  <a:tcPr marL="68580" marR="68580" marT="34290" marB="34290"/>
-                </a:tc>
-                <a:tc>
-                  <a:txBody>
-                    <a:bodyPr/>
-                    <a:lstStyle/>
-                    <a:p>
-                      <a:endParaRPr lang="en-US" sz="800" b="0" i="1" dirty="0"/>
-                    </a:p>
-                  </a:txBody>
-                  <a:tcPr marL="68580" marR="68580" marT="34290" marB="34290"/>
-                </a:tc>
-                <a:extLst>
-                  <a:ext uri="{0D108BD9-81ED-4DB2-BD59-A6C34878D82A}">
-                    <a16:rowId xmlns:a16="http://schemas.microsoft.com/office/drawing/2014/main" val="2385345212"/>
-                  </a:ext>
-                </a:extLst>
-              </a:tr>
-              <a:tr h="1088989">
-                <a:tc>
-                  <a:txBody>
-                    <a:bodyPr/>
-                    <a:lstStyle/>
-                    <a:p>
-                      <a:r>
-                        <a:rPr lang="en-US" sz="800" dirty="0"/>
-                        <a:t>ride_source</a:t>
-                      </a:r>
-                    </a:p>
-                    <a:p>
-                      <a:r>
-                        <a:rPr lang="en-US" sz="800" dirty="0"/>
-                        <a:t>passenger_count</a:t>
-                      </a:r>
-                    </a:p>
-                    <a:p>
-                      <a:r>
-                        <a:rPr lang="en-US" sz="800" dirty="0"/>
-                        <a:t>Pickup_zipcode</a:t>
-                      </a:r>
-                    </a:p>
-                    <a:p>
-                      <a:r>
-                        <a:rPr lang="en-US" sz="800" dirty="0"/>
-                        <a:t>Pickup_year</a:t>
-                      </a:r>
-                    </a:p>
-                    <a:p>
-                      <a:r>
-                        <a:rPr lang="en-US" sz="800" dirty="0"/>
-                        <a:t>Pickup_month</a:t>
-                      </a:r>
-                    </a:p>
-                    <a:p>
-                      <a:r>
-                        <a:rPr lang="en-US" sz="800" dirty="0"/>
-                        <a:t>Pickup_day</a:t>
-                      </a:r>
-                    </a:p>
-                    <a:p>
-                      <a:r>
-                        <a:rPr lang="en-US" sz="800" dirty="0"/>
-                        <a:t>Pickup_hour</a:t>
-                      </a:r>
-                    </a:p>
-                    <a:p>
-                      <a:r>
-                        <a:rPr lang="en-US" sz="800" dirty="0"/>
-                        <a:t>Ride_count</a:t>
-                      </a:r>
-                    </a:p>
-                  </a:txBody>
-                  <a:tcPr marL="68580" marR="68580" marT="34290" marB="34290"/>
-                </a:tc>
-                <a:tc>
-                  <a:txBody>
-                    <a:bodyPr/>
-                    <a:lstStyle/>
-                    <a:p>
-                      <a:r>
-                        <a:rPr lang="en-US" sz="800" dirty="0"/>
-                        <a:t>string</a:t>
-                      </a:r>
-                    </a:p>
-                    <a:p>
-                      <a:r>
-                        <a:rPr lang="en-US" sz="800" dirty="0"/>
-                        <a:t>Int</a:t>
-                      </a:r>
-                    </a:p>
-                    <a:p>
-                      <a:r>
-                        <a:rPr lang="en-US" sz="800" dirty="0"/>
-                        <a:t>String</a:t>
-                      </a:r>
-                    </a:p>
-                    <a:p>
-                      <a:r>
-                        <a:rPr lang="en-US" sz="800" dirty="0"/>
-                        <a:t>Int</a:t>
-                      </a:r>
-                    </a:p>
-                    <a:p>
-                      <a:r>
-                        <a:rPr lang="en-US" sz="800" dirty="0"/>
-                        <a:t>Int</a:t>
-                      </a:r>
-                    </a:p>
-                    <a:p>
-                      <a:r>
-                        <a:rPr lang="en-US" sz="800" dirty="0"/>
-                        <a:t>Int</a:t>
-                      </a:r>
-                    </a:p>
-                    <a:p>
-                      <a:r>
-                        <a:rPr lang="en-US" sz="800" dirty="0"/>
-                        <a:t>Int</a:t>
-                      </a:r>
-                    </a:p>
-                    <a:p>
-                      <a:r>
-                        <a:rPr lang="en-US" sz="800" dirty="0"/>
-                        <a:t>Big Int</a:t>
-                      </a:r>
-                    </a:p>
-                  </a:txBody>
-                  <a:tcPr marL="68580" marR="68580" marT="34290" marB="34290"/>
-                </a:tc>
-                <a:extLst>
-                  <a:ext uri="{0D108BD9-81ED-4DB2-BD59-A6C34878D82A}">
-                    <a16:rowId xmlns:a16="http://schemas.microsoft.com/office/drawing/2014/main" val="973132991"/>
-                  </a:ext>
-                </a:extLst>
-              </a:tr>
-            </a:tbl>
-          </a:graphicData>
-        </a:graphic>
-      </p:graphicFrame>
-      <p:cxnSp>
-        <p:nvCxnSpPr>
-          <p:cNvPr id="14" name="Straight Connector 13"/>
-          <p:cNvCxnSpPr/>
-          <p:nvPr/>
-        </p:nvCxnSpPr>
-        <p:spPr>
-          <a:xfrm flipH="1" flipV="1">
-            <a:off x="6182094" y="1349448"/>
-            <a:ext cx="174760" cy="622061"/>
-          </a:xfrm>
-          <a:prstGeom prst="line">
-            <a:avLst/>
-          </a:prstGeom>
-        </p:spPr>
-        <p:style>
-          <a:lnRef idx="1">
-            <a:schemeClr val="accent1"/>
-          </a:lnRef>
-          <a:fillRef idx="0">
-            <a:schemeClr val="accent1"/>
-          </a:fillRef>
-          <a:effectRef idx="0">
-            <a:schemeClr val="accent1"/>
-          </a:effectRef>
-          <a:fontRef idx="minor">
-            <a:schemeClr val="tx1"/>
-          </a:fontRef>
-        </p:style>
-      </p:cxnSp>
-      <p:cxnSp>
-        <p:nvCxnSpPr>
-          <p:cNvPr id="15" name="Straight Connector 14"/>
-          <p:cNvCxnSpPr/>
-          <p:nvPr/>
-        </p:nvCxnSpPr>
-        <p:spPr>
-          <a:xfrm flipV="1">
-            <a:off x="5857940" y="3899886"/>
-            <a:ext cx="743752" cy="879764"/>
-          </a:xfrm>
-          <a:prstGeom prst="line">
-            <a:avLst/>
-          </a:prstGeom>
-        </p:spPr>
-        <p:style>
-          <a:lnRef idx="1">
-            <a:schemeClr val="accent1"/>
-          </a:lnRef>
-          <a:fillRef idx="0">
-            <a:schemeClr val="accent1"/>
-          </a:fillRef>
-          <a:effectRef idx="0">
-            <a:schemeClr val="accent1"/>
-          </a:effectRef>
-          <a:fontRef idx="minor">
-            <a:schemeClr val="tx1"/>
-          </a:fontRef>
-        </p:style>
-      </p:cxnSp>
-      <p:cxnSp>
-        <p:nvCxnSpPr>
-          <p:cNvPr id="16" name="Straight Connector 15"/>
-          <p:cNvCxnSpPr/>
-          <p:nvPr/>
-        </p:nvCxnSpPr>
-        <p:spPr>
-          <a:xfrm>
-            <a:off x="2611582" y="3886801"/>
-            <a:ext cx="1602344" cy="824587"/>
-          </a:xfrm>
-          <a:prstGeom prst="line">
-            <a:avLst/>
-          </a:prstGeom>
-        </p:spPr>
-        <p:style>
-          <a:lnRef idx="1">
-            <a:schemeClr val="accent1"/>
-          </a:lnRef>
-          <a:fillRef idx="0">
-            <a:schemeClr val="accent1"/>
-          </a:fillRef>
-          <a:effectRef idx="0">
-            <a:schemeClr val="accent1"/>
-          </a:effectRef>
-          <a:fontRef idx="minor">
-            <a:schemeClr val="tx1"/>
-          </a:fontRef>
-        </p:style>
-      </p:cxnSp>
-      <p:sp>
-        <p:nvSpPr>
-          <p:cNvPr id="17" name="TextBox 16"/>
-          <p:cNvSpPr txBox="1"/>
-          <p:nvPr/>
-        </p:nvSpPr>
-        <p:spPr>
-          <a:xfrm>
-            <a:off x="342514" y="2485672"/>
-            <a:ext cx="1529978" cy="553998"/>
-          </a:xfrm>
-          <a:prstGeom prst="rect">
-            <a:avLst/>
-          </a:prstGeom>
-          <a:noFill/>
-        </p:spPr>
-        <p:txBody>
-          <a:bodyPr wrap="square" rtlCol="0">
-            <a:spAutoFit/>
-          </a:bodyPr>
-          <a:lstStyle/>
-          <a:p>
-            <a:r>
-              <a:rPr lang="en-US" sz="750" i="1" dirty="0">
-                <a:latin typeface="+mj-lt"/>
-              </a:rPr>
-              <a:t>Group on all fields (relative PK) and sum rides</a:t>
-            </a:r>
-          </a:p>
-          <a:p>
-            <a:r>
-              <a:rPr lang="en-US" sz="750" i="1" dirty="0">
-                <a:latin typeface="+mj-lt"/>
-              </a:rPr>
-              <a:t>Week and Day of Week are Used in Prediction Model</a:t>
-            </a:r>
-          </a:p>
-        </p:txBody>
-      </p:sp>
-      <p:sp>
-        <p:nvSpPr>
-          <p:cNvPr id="18" name="Rectangle 17"/>
-          <p:cNvSpPr/>
-          <p:nvPr/>
-        </p:nvSpPr>
-        <p:spPr>
-          <a:xfrm>
-            <a:off x="4186210" y="4503638"/>
-            <a:ext cx="1601817" cy="230832"/>
-          </a:xfrm>
-          <a:prstGeom prst="rect">
-            <a:avLst/>
-          </a:prstGeom>
-        </p:spPr>
-        <p:txBody>
-          <a:bodyPr wrap="square">
-            <a:spAutoFit/>
-          </a:bodyPr>
-          <a:lstStyle/>
-          <a:p>
-            <a:pPr algn="ctr"/>
-            <a:r>
-              <a:rPr lang="en-US" sz="900" b="1" dirty="0">
-                <a:latin typeface="+mj-lt"/>
-              </a:rPr>
-              <a:t>Location Borough Map</a:t>
-            </a:r>
-          </a:p>
-        </p:txBody>
-      </p:sp>
-      <p:graphicFrame>
-        <p:nvGraphicFramePr>
-          <p:cNvPr id="19" name="Table 18"/>
-          <p:cNvGraphicFramePr>
-            <a:graphicFrameLocks noGrp="1"/>
-          </p:cNvGraphicFramePr>
-          <p:nvPr>
-            <p:extLst>
-              <p:ext uri="{D42A27DB-BD31-4B8C-83A1-F6EECF244321}">
-                <p14:modId xmlns:p14="http://schemas.microsoft.com/office/powerpoint/2010/main" val="871237870"/>
-              </p:ext>
-            </p:extLst>
-          </p:nvPr>
-        </p:nvGraphicFramePr>
-        <p:xfrm>
-          <a:off x="4617028" y="1207625"/>
-          <a:ext cx="1565066" cy="465203"/>
-        </p:xfrm>
-        <a:graphic>
-          <a:graphicData uri="http://schemas.openxmlformats.org/drawingml/2006/table">
-            <a:tbl>
-              <a:tblPr bandRow="1">
-                <a:tableStyleId>{5C22544A-7EE6-4342-B048-85BDC9FD1C3A}</a:tableStyleId>
-              </a:tblPr>
-              <a:tblGrid>
-                <a:gridCol w="1036421">
-                  <a:extLst>
-                    <a:ext uri="{9D8B030D-6E8A-4147-A177-3AD203B41FA5}">
-                      <a16:colId xmlns:a16="http://schemas.microsoft.com/office/drawing/2014/main" val="2146396053"/>
-                    </a:ext>
-                  </a:extLst>
-                </a:gridCol>
-                <a:gridCol w="528645">
-                  <a:extLst>
-                    <a:ext uri="{9D8B030D-6E8A-4147-A177-3AD203B41FA5}">
-                      <a16:colId xmlns:a16="http://schemas.microsoft.com/office/drawing/2014/main" val="872119490"/>
-                    </a:ext>
-                  </a:extLst>
-                </a:gridCol>
-              </a:tblGrid>
-              <a:tr h="190500">
-                <a:tc>
-                  <a:txBody>
-                    <a:bodyPr/>
-                    <a:lstStyle/>
-                    <a:p>
-                      <a:r>
-                        <a:rPr lang="en-US" sz="800" b="0" i="1" dirty="0"/>
-                        <a:t>Zip_code</a:t>
-                      </a:r>
-                    </a:p>
-                  </a:txBody>
-                  <a:tcPr marL="68580" marR="68580" marT="34290" marB="34290"/>
-                </a:tc>
-                <a:tc>
-                  <a:txBody>
-                    <a:bodyPr/>
-                    <a:lstStyle/>
-                    <a:p>
-                      <a:r>
-                        <a:rPr lang="en-US" sz="800" b="0" i="1" dirty="0"/>
-                        <a:t>string</a:t>
-                      </a:r>
-                    </a:p>
-                  </a:txBody>
-                  <a:tcPr marL="68580" marR="68580" marT="34290" marB="34290"/>
-                </a:tc>
-                <a:extLst>
-                  <a:ext uri="{0D108BD9-81ED-4DB2-BD59-A6C34878D82A}">
-                    <a16:rowId xmlns:a16="http://schemas.microsoft.com/office/drawing/2014/main" val="2385345212"/>
-                  </a:ext>
-                </a:extLst>
-              </a:tr>
-              <a:tr h="274703">
-                <a:tc>
-                  <a:txBody>
-                    <a:bodyPr/>
-                    <a:lstStyle/>
-                    <a:p>
-                      <a:r>
-                        <a:rPr lang="en-US" sz="800" dirty="0"/>
-                        <a:t>Borough</a:t>
-                      </a:r>
-                    </a:p>
-                  </a:txBody>
-                  <a:tcPr marL="68580" marR="68580" marT="34290" marB="34290"/>
-                </a:tc>
-                <a:tc>
-                  <a:txBody>
-                    <a:bodyPr/>
-                    <a:lstStyle/>
-                    <a:p>
-                      <a:r>
-                        <a:rPr lang="en-US" sz="800" dirty="0"/>
-                        <a:t>String</a:t>
-                      </a:r>
-                    </a:p>
-                  </a:txBody>
-                  <a:tcPr marL="68580" marR="68580" marT="34290" marB="34290"/>
-                </a:tc>
-                <a:extLst>
-                  <a:ext uri="{0D108BD9-81ED-4DB2-BD59-A6C34878D82A}">
-                    <a16:rowId xmlns:a16="http://schemas.microsoft.com/office/drawing/2014/main" val="973132991"/>
-                  </a:ext>
-                </a:extLst>
-              </a:tr>
-            </a:tbl>
-          </a:graphicData>
-        </a:graphic>
-      </p:graphicFrame>
-      <p:sp>
-        <p:nvSpPr>
-          <p:cNvPr id="20" name="Rectangle 19"/>
-          <p:cNvSpPr/>
-          <p:nvPr/>
-        </p:nvSpPr>
-        <p:spPr>
-          <a:xfrm>
-            <a:off x="4580276" y="994324"/>
-            <a:ext cx="1601817" cy="230832"/>
-          </a:xfrm>
-          <a:prstGeom prst="rect">
-            <a:avLst/>
-          </a:prstGeom>
-        </p:spPr>
-        <p:txBody>
-          <a:bodyPr wrap="square">
-            <a:spAutoFit/>
-          </a:bodyPr>
-          <a:lstStyle/>
-          <a:p>
-            <a:pPr algn="ctr"/>
-            <a:r>
-              <a:rPr lang="en-US" sz="900" b="1" dirty="0">
-                <a:latin typeface="+mj-lt"/>
-              </a:rPr>
-              <a:t>Zip by Neighborhood</a:t>
-            </a:r>
-          </a:p>
-        </p:txBody>
-      </p:sp>
-      <p:sp>
-        <p:nvSpPr>
-          <p:cNvPr id="21" name="Rectangle 20"/>
-          <p:cNvSpPr/>
-          <p:nvPr/>
-        </p:nvSpPr>
-        <p:spPr>
-          <a:xfrm>
-            <a:off x="918081" y="3279566"/>
-            <a:ext cx="1751318" cy="230832"/>
-          </a:xfrm>
-          <a:prstGeom prst="rect">
-            <a:avLst/>
-          </a:prstGeom>
-        </p:spPr>
-        <p:txBody>
-          <a:bodyPr wrap="square">
-            <a:spAutoFit/>
-          </a:bodyPr>
-          <a:lstStyle/>
-          <a:p>
-            <a:pPr algn="ctr"/>
-            <a:r>
-              <a:rPr lang="en-US" sz="900" b="1" dirty="0">
-                <a:latin typeface="+mj-lt"/>
-              </a:rPr>
-              <a:t>Rides (FHV)</a:t>
-            </a:r>
-          </a:p>
-        </p:txBody>
-      </p:sp>
-      <p:graphicFrame>
-        <p:nvGraphicFramePr>
-          <p:cNvPr id="22" name="Table 21"/>
-          <p:cNvGraphicFramePr>
-            <a:graphicFrameLocks noGrp="1"/>
-          </p:cNvGraphicFramePr>
-          <p:nvPr>
-            <p:extLst>
-              <p:ext uri="{D42A27DB-BD31-4B8C-83A1-F6EECF244321}">
-                <p14:modId xmlns:p14="http://schemas.microsoft.com/office/powerpoint/2010/main" val="2064068903"/>
-              </p:ext>
-            </p:extLst>
-          </p:nvPr>
-        </p:nvGraphicFramePr>
-        <p:xfrm>
-          <a:off x="918081" y="3482389"/>
-          <a:ext cx="1751318" cy="1400744"/>
-        </p:xfrm>
-        <a:graphic>
-          <a:graphicData uri="http://schemas.openxmlformats.org/drawingml/2006/table">
-            <a:tbl>
-              <a:tblPr bandRow="1">
-                <a:tableStyleId>{5C22544A-7EE6-4342-B048-85BDC9FD1C3A}</a:tableStyleId>
-              </a:tblPr>
-              <a:tblGrid>
-                <a:gridCol w="1287768">
-                  <a:extLst>
-                    <a:ext uri="{9D8B030D-6E8A-4147-A177-3AD203B41FA5}">
-                      <a16:colId xmlns:a16="http://schemas.microsoft.com/office/drawing/2014/main" val="2146396053"/>
-                    </a:ext>
-                  </a:extLst>
-                </a:gridCol>
-                <a:gridCol w="463550">
-                  <a:extLst>
-                    <a:ext uri="{9D8B030D-6E8A-4147-A177-3AD203B41FA5}">
-                      <a16:colId xmlns:a16="http://schemas.microsoft.com/office/drawing/2014/main" val="872119490"/>
-                    </a:ext>
-                  </a:extLst>
-                </a:gridCol>
-              </a:tblGrid>
-              <a:tr h="190500">
-                <a:tc>
-                  <a:txBody>
-                    <a:bodyPr/>
-                    <a:lstStyle/>
-                    <a:p>
-                      <a:endParaRPr lang="en-US" sz="800" b="0" i="1" dirty="0"/>
-                    </a:p>
-                  </a:txBody>
-                  <a:tcPr marL="68580" marR="68580" marT="34290" marB="34290"/>
-                </a:tc>
-                <a:tc>
-                  <a:txBody>
-                    <a:bodyPr/>
-                    <a:lstStyle/>
-                    <a:p>
-                      <a:endParaRPr lang="en-US" sz="800" b="0" i="1" dirty="0"/>
-                    </a:p>
-                  </a:txBody>
-                  <a:tcPr marL="68580" marR="68580" marT="34290" marB="34290"/>
-                </a:tc>
-                <a:extLst>
-                  <a:ext uri="{0D108BD9-81ED-4DB2-BD59-A6C34878D82A}">
-                    <a16:rowId xmlns:a16="http://schemas.microsoft.com/office/drawing/2014/main" val="2385345212"/>
-                  </a:ext>
-                </a:extLst>
-              </a:tr>
-              <a:tr h="1210244">
-                <a:tc>
-                  <a:txBody>
-                    <a:bodyPr/>
-                    <a:lstStyle/>
-                    <a:p>
-                      <a:r>
-                        <a:rPr lang="en-US" sz="800" dirty="0"/>
-                        <a:t>ride_source</a:t>
-                      </a:r>
-                    </a:p>
-                    <a:p>
-                      <a:r>
-                        <a:rPr lang="en-US" sz="800" dirty="0"/>
-                        <a:t>locationID</a:t>
-                      </a:r>
-                    </a:p>
-                    <a:p>
-                      <a:r>
-                        <a:rPr lang="en-US" sz="800" dirty="0"/>
-                        <a:t>Pickup_year</a:t>
-                      </a:r>
-                    </a:p>
-                    <a:p>
-                      <a:r>
-                        <a:rPr lang="en-US" sz="800" dirty="0"/>
-                        <a:t>Pickup_month</a:t>
-                      </a:r>
-                    </a:p>
-                    <a:p>
-                      <a:r>
-                        <a:rPr lang="en-US" sz="800" dirty="0"/>
-                        <a:t>Pickup_day</a:t>
-                      </a:r>
-                    </a:p>
-                    <a:p>
-                      <a:r>
-                        <a:rPr lang="en-US" sz="800" dirty="0"/>
-                        <a:t>Pickup_hour</a:t>
-                      </a:r>
-                    </a:p>
-                    <a:p>
-                      <a:r>
-                        <a:rPr lang="en-US" sz="800" dirty="0"/>
-                        <a:t>Pickup_dayofweek</a:t>
-                      </a:r>
-                    </a:p>
-                    <a:p>
-                      <a:r>
-                        <a:rPr lang="en-US" sz="800" dirty="0"/>
-                        <a:t>Pickup_week</a:t>
-                      </a:r>
-                    </a:p>
-                    <a:p>
-                      <a:r>
-                        <a:rPr lang="en-US" sz="800" dirty="0"/>
-                        <a:t>Ride_count</a:t>
-                      </a:r>
-                    </a:p>
-                  </a:txBody>
-                  <a:tcPr marL="68580" marR="68580" marT="34290" marB="34290"/>
-                </a:tc>
-                <a:tc>
-                  <a:txBody>
-                    <a:bodyPr/>
-                    <a:lstStyle/>
-                    <a:p>
-                      <a:r>
-                        <a:rPr lang="en-US" sz="800" dirty="0"/>
-                        <a:t>string</a:t>
-                      </a:r>
-                    </a:p>
-                    <a:p>
-                      <a:r>
-                        <a:rPr lang="en-US" sz="800" dirty="0"/>
-                        <a:t>Int</a:t>
-                      </a:r>
-                    </a:p>
-                    <a:p>
-                      <a:r>
-                        <a:rPr lang="en-US" sz="800" dirty="0"/>
-                        <a:t>Int</a:t>
-                      </a:r>
-                    </a:p>
-                    <a:p>
-                      <a:r>
-                        <a:rPr lang="en-US" sz="800" dirty="0"/>
-                        <a:t>Int</a:t>
-                      </a:r>
-                    </a:p>
-                    <a:p>
-                      <a:r>
-                        <a:rPr lang="en-US" sz="800" dirty="0"/>
-                        <a:t>Int</a:t>
-                      </a:r>
-                    </a:p>
-                    <a:p>
-                      <a:r>
-                        <a:rPr lang="en-US" sz="800" dirty="0"/>
-                        <a:t>Int</a:t>
-                      </a:r>
-                    </a:p>
-                    <a:p>
-                      <a:r>
-                        <a:rPr lang="en-US" sz="800" dirty="0"/>
-                        <a:t>Int</a:t>
-                      </a:r>
-                    </a:p>
-                    <a:p>
-                      <a:r>
-                        <a:rPr lang="en-US" sz="800" dirty="0"/>
-                        <a:t>Int</a:t>
-                      </a:r>
-                    </a:p>
-                    <a:p>
-                      <a:r>
-                        <a:rPr lang="en-US" sz="800" dirty="0"/>
-                        <a:t>Big int</a:t>
-                      </a:r>
-                    </a:p>
-                  </a:txBody>
-                  <a:tcPr marL="68580" marR="68580" marT="34290" marB="34290"/>
-                </a:tc>
-                <a:extLst>
-                  <a:ext uri="{0D108BD9-81ED-4DB2-BD59-A6C34878D82A}">
-                    <a16:rowId xmlns:a16="http://schemas.microsoft.com/office/drawing/2014/main" val="973132991"/>
-                  </a:ext>
-                </a:extLst>
-              </a:tr>
-            </a:tbl>
-          </a:graphicData>
-        </a:graphic>
-      </p:graphicFrame>
-      <p:sp>
-        <p:nvSpPr>
-          <p:cNvPr id="23" name="TextBox 22"/>
-          <p:cNvSpPr txBox="1"/>
-          <p:nvPr/>
-        </p:nvSpPr>
-        <p:spPr>
-          <a:xfrm>
-            <a:off x="4066111" y="2993308"/>
-            <a:ext cx="831344" cy="553998"/>
-          </a:xfrm>
-          <a:prstGeom prst="rect">
-            <a:avLst/>
-          </a:prstGeom>
-          <a:noFill/>
-        </p:spPr>
-        <p:txBody>
-          <a:bodyPr wrap="square" rtlCol="0">
-            <a:spAutoFit/>
-          </a:bodyPr>
-          <a:lstStyle/>
-          <a:p>
-            <a:pPr algn="r"/>
-            <a:r>
-              <a:rPr lang="en-US" sz="750" i="1" dirty="0">
-                <a:latin typeface="+mj-lt"/>
-              </a:rPr>
-              <a:t>Weather as recorded at LaGuardia Airport</a:t>
-            </a:r>
-          </a:p>
-        </p:txBody>
-      </p:sp>
-      <p:sp>
-        <p:nvSpPr>
-          <p:cNvPr id="24" name="Arrow: Right 23"/>
-          <p:cNvSpPr/>
-          <p:nvPr/>
-        </p:nvSpPr>
-        <p:spPr>
-          <a:xfrm>
-            <a:off x="1921181" y="1482287"/>
-            <a:ext cx="233201" cy="204992"/>
-          </a:xfrm>
-          <a:prstGeom prst="rightArrow">
-            <a:avLst/>
-          </a:prstGeom>
-        </p:spPr>
-        <p:style>
-          <a:lnRef idx="2">
-            <a:schemeClr val="accent1">
-              <a:shade val="50000"/>
-            </a:schemeClr>
-          </a:lnRef>
-          <a:fillRef idx="1">
-            <a:schemeClr val="accent1"/>
-          </a:fillRef>
-          <a:effectRef idx="0">
-            <a:schemeClr val="accent1"/>
-          </a:effectRef>
-          <a:fontRef idx="minor">
-            <a:schemeClr val="lt1"/>
-          </a:fontRef>
-        </p:style>
-        <p:txBody>
-          <a:bodyPr rot="0" spcFirstLastPara="0" vertOverflow="overflow" horzOverflow="overflow" vert="horz" wrap="square" lIns="68580" tIns="34290" rIns="68580" bIns="34290" numCol="1" spcCol="0" rtlCol="0" fromWordArt="0" anchor="ctr" anchorCtr="0" forceAA="0" compatLnSpc="1">
-            <a:prstTxWarp prst="textNoShape">
-              <a:avLst/>
-            </a:prstTxWarp>
-            <a:noAutofit/>
-          </a:bodyPr>
-          <a:lstStyle/>
-          <a:p>
-            <a:pPr algn="ctr"/>
-            <a:endParaRPr lang="en-US" sz="1050" dirty="0">
-              <a:latin typeface="+mj-lt"/>
-            </a:endParaRPr>
-          </a:p>
-        </p:txBody>
-      </p:sp>
-      <p:sp>
-        <p:nvSpPr>
-          <p:cNvPr id="25" name="Arrow: Right 24"/>
-          <p:cNvSpPr/>
-          <p:nvPr/>
-        </p:nvSpPr>
-        <p:spPr>
-          <a:xfrm>
-            <a:off x="3852070" y="1918686"/>
-            <a:ext cx="2624048" cy="297873"/>
-          </a:xfrm>
-          <a:prstGeom prst="rightArrow">
-            <a:avLst/>
-          </a:prstGeom>
-        </p:spPr>
-        <p:style>
-          <a:lnRef idx="2">
-            <a:schemeClr val="accent1">
-              <a:shade val="50000"/>
-            </a:schemeClr>
-          </a:lnRef>
-          <a:fillRef idx="1">
-            <a:schemeClr val="accent1"/>
-          </a:fillRef>
-          <a:effectRef idx="0">
-            <a:schemeClr val="accent1"/>
-          </a:effectRef>
-          <a:fontRef idx="minor">
-            <a:schemeClr val="lt1"/>
-          </a:fontRef>
-        </p:style>
-        <p:txBody>
-          <a:bodyPr rot="0" spcFirstLastPara="0" vertOverflow="overflow" horzOverflow="overflow" vert="horz" wrap="square" lIns="68580" tIns="34290" rIns="68580" bIns="34290" numCol="1" spcCol="0" rtlCol="0" fromWordArt="0" anchor="ctr" anchorCtr="0" forceAA="0" compatLnSpc="1">
-            <a:prstTxWarp prst="textNoShape">
-              <a:avLst/>
-            </a:prstTxWarp>
-            <a:noAutofit/>
-          </a:bodyPr>
-          <a:lstStyle/>
-          <a:p>
-            <a:pPr algn="ctr"/>
-            <a:endParaRPr lang="en-US" sz="1050" dirty="0">
-              <a:latin typeface="+mj-lt"/>
-            </a:endParaRPr>
-          </a:p>
-        </p:txBody>
-      </p:sp>
-      <p:cxnSp>
-        <p:nvCxnSpPr>
-          <p:cNvPr id="26" name="Straight Connector 25"/>
-          <p:cNvCxnSpPr/>
-          <p:nvPr/>
-        </p:nvCxnSpPr>
-        <p:spPr>
-          <a:xfrm flipH="1">
-            <a:off x="3753793" y="1309537"/>
-            <a:ext cx="863234" cy="237134"/>
-          </a:xfrm>
-          <a:prstGeom prst="line">
-            <a:avLst/>
-          </a:prstGeom>
-        </p:spPr>
-        <p:style>
-          <a:lnRef idx="1">
-            <a:schemeClr val="accent1"/>
-          </a:lnRef>
-          <a:fillRef idx="0">
-            <a:schemeClr val="accent1"/>
-          </a:fillRef>
-          <a:effectRef idx="0">
-            <a:schemeClr val="accent1"/>
-          </a:effectRef>
-          <a:fontRef idx="minor">
-            <a:schemeClr val="tx1"/>
-          </a:fontRef>
-        </p:style>
-      </p:cxnSp>
-      <p:graphicFrame>
-        <p:nvGraphicFramePr>
-          <p:cNvPr id="27" name="Table 26"/>
-          <p:cNvGraphicFramePr>
-            <a:graphicFrameLocks noGrp="1"/>
-          </p:cNvGraphicFramePr>
-          <p:nvPr>
-            <p:extLst>
-              <p:ext uri="{D42A27DB-BD31-4B8C-83A1-F6EECF244321}">
-                <p14:modId xmlns:p14="http://schemas.microsoft.com/office/powerpoint/2010/main" val="2938988261"/>
-              </p:ext>
-            </p:extLst>
-          </p:nvPr>
-        </p:nvGraphicFramePr>
-        <p:xfrm>
-          <a:off x="4186210" y="4685768"/>
-          <a:ext cx="1751318" cy="433010"/>
-        </p:xfrm>
-        <a:graphic>
-          <a:graphicData uri="http://schemas.openxmlformats.org/drawingml/2006/table">
-            <a:tbl>
-              <a:tblPr bandRow="1">
-                <a:tableStyleId>{5C22544A-7EE6-4342-B048-85BDC9FD1C3A}</a:tableStyleId>
-              </a:tblPr>
-              <a:tblGrid>
-                <a:gridCol w="1287768">
-                  <a:extLst>
-                    <a:ext uri="{9D8B030D-6E8A-4147-A177-3AD203B41FA5}">
-                      <a16:colId xmlns:a16="http://schemas.microsoft.com/office/drawing/2014/main" val="2146396053"/>
-                    </a:ext>
-                  </a:extLst>
-                </a:gridCol>
-                <a:gridCol w="463550">
-                  <a:extLst>
-                    <a:ext uri="{9D8B030D-6E8A-4147-A177-3AD203B41FA5}">
-                      <a16:colId xmlns:a16="http://schemas.microsoft.com/office/drawing/2014/main" val="872119490"/>
-                    </a:ext>
-                  </a:extLst>
-                </a:gridCol>
-              </a:tblGrid>
-              <a:tr h="190500">
-                <a:tc>
-                  <a:txBody>
-                    <a:bodyPr/>
-                    <a:lstStyle/>
-                    <a:p>
-                      <a:r>
-                        <a:rPr lang="en-US" sz="800" b="0" i="1" dirty="0"/>
-                        <a:t>locationID</a:t>
-                      </a:r>
-                    </a:p>
-                  </a:txBody>
-                  <a:tcPr marL="68580" marR="68580" marT="34290" marB="34290"/>
-                </a:tc>
-                <a:tc>
-                  <a:txBody>
-                    <a:bodyPr/>
-                    <a:lstStyle/>
-                    <a:p>
-                      <a:r>
-                        <a:rPr lang="en-US" sz="800" b="0" i="1" dirty="0"/>
-                        <a:t>int</a:t>
-                      </a:r>
-                    </a:p>
-                  </a:txBody>
-                  <a:tcPr marL="68580" marR="68580" marT="34290" marB="34290"/>
-                </a:tc>
-                <a:extLst>
-                  <a:ext uri="{0D108BD9-81ED-4DB2-BD59-A6C34878D82A}">
-                    <a16:rowId xmlns:a16="http://schemas.microsoft.com/office/drawing/2014/main" val="2385345212"/>
-                  </a:ext>
-                </a:extLst>
-              </a:tr>
-              <a:tr h="242510">
-                <a:tc>
-                  <a:txBody>
-                    <a:bodyPr/>
-                    <a:lstStyle/>
-                    <a:p>
-                      <a:r>
-                        <a:rPr lang="en-US" sz="800" dirty="0"/>
-                        <a:t>Borough</a:t>
-                      </a:r>
-                    </a:p>
-                  </a:txBody>
-                  <a:tcPr marL="68580" marR="68580" marT="34290" marB="34290"/>
-                </a:tc>
-                <a:tc>
-                  <a:txBody>
-                    <a:bodyPr/>
-                    <a:lstStyle/>
-                    <a:p>
-                      <a:r>
-                        <a:rPr lang="en-US" sz="800" dirty="0"/>
-                        <a:t>String</a:t>
-                      </a:r>
-                    </a:p>
-                  </a:txBody>
-                  <a:tcPr marL="68580" marR="68580" marT="34290" marB="34290"/>
-                </a:tc>
-                <a:extLst>
-                  <a:ext uri="{0D108BD9-81ED-4DB2-BD59-A6C34878D82A}">
-                    <a16:rowId xmlns:a16="http://schemas.microsoft.com/office/drawing/2014/main" val="973132991"/>
-                  </a:ext>
-                </a:extLst>
-              </a:tr>
-            </a:tbl>
-          </a:graphicData>
-        </a:graphic>
-      </p:graphicFrame>
-      <p:sp>
-        <p:nvSpPr>
-          <p:cNvPr id="28" name="Arrow: Right 27"/>
-          <p:cNvSpPr/>
-          <p:nvPr/>
-        </p:nvSpPr>
-        <p:spPr>
-          <a:xfrm>
-            <a:off x="2873386" y="3670488"/>
-            <a:ext cx="3963832" cy="297873"/>
-          </a:xfrm>
-          <a:prstGeom prst="rightArrow">
-            <a:avLst/>
-          </a:prstGeom>
-        </p:spPr>
-        <p:style>
-          <a:lnRef idx="2">
-            <a:schemeClr val="accent1">
-              <a:shade val="50000"/>
-            </a:schemeClr>
-          </a:lnRef>
-          <a:fillRef idx="1">
-            <a:schemeClr val="accent1"/>
-          </a:fillRef>
-          <a:effectRef idx="0">
-            <a:schemeClr val="accent1"/>
-          </a:effectRef>
-          <a:fontRef idx="minor">
-            <a:schemeClr val="lt1"/>
-          </a:fontRef>
-        </p:style>
-        <p:txBody>
-          <a:bodyPr rot="0" spcFirstLastPara="0" vertOverflow="overflow" horzOverflow="overflow" vert="horz" wrap="square" lIns="68580" tIns="34290" rIns="68580" bIns="34290" numCol="1" spcCol="0" rtlCol="0" fromWordArt="0" anchor="ctr" anchorCtr="0" forceAA="0" compatLnSpc="1">
-            <a:prstTxWarp prst="textNoShape">
-              <a:avLst/>
-            </a:prstTxWarp>
-            <a:noAutofit/>
-          </a:bodyPr>
-          <a:lstStyle/>
-          <a:p>
-            <a:pPr algn="ctr"/>
-            <a:endParaRPr lang="en-US" sz="1050" dirty="0">
-              <a:latin typeface="+mj-lt"/>
-            </a:endParaRPr>
-          </a:p>
-        </p:txBody>
-      </p:sp>
-      <p:sp>
-        <p:nvSpPr>
-          <p:cNvPr id="29" name="TextBox 28"/>
-          <p:cNvSpPr txBox="1"/>
-          <p:nvPr/>
-        </p:nvSpPr>
-        <p:spPr>
-          <a:xfrm>
-            <a:off x="6907130" y="3894637"/>
-            <a:ext cx="1737797" cy="438582"/>
-          </a:xfrm>
-          <a:prstGeom prst="rect">
-            <a:avLst/>
-          </a:prstGeom>
-          <a:noFill/>
-        </p:spPr>
-        <p:txBody>
-          <a:bodyPr wrap="square" rtlCol="0">
-            <a:spAutoFit/>
-          </a:bodyPr>
-          <a:lstStyle/>
-          <a:p>
-            <a:r>
-              <a:rPr lang="en-US" sz="750" i="1" dirty="0">
-                <a:latin typeface="+mj-lt"/>
-              </a:rPr>
-              <a:t>Distinct (PK) on ride_source, zip code, passenger count, and hour/day/month/year</a:t>
-            </a:r>
-          </a:p>
-        </p:txBody>
-      </p:sp>
-      <p:sp>
-        <p:nvSpPr>
-          <p:cNvPr id="30" name="Arrow: Right 29"/>
-          <p:cNvSpPr/>
-          <p:nvPr/>
-        </p:nvSpPr>
-        <p:spPr>
-          <a:xfrm>
-            <a:off x="6306265" y="2768078"/>
-            <a:ext cx="573824" cy="363474"/>
-          </a:xfrm>
-          <a:prstGeom prst="rightArrow">
-            <a:avLst/>
-          </a:prstGeom>
-        </p:spPr>
-        <p:style>
-          <a:lnRef idx="2">
-            <a:schemeClr val="accent1">
-              <a:shade val="50000"/>
-            </a:schemeClr>
-          </a:lnRef>
-          <a:fillRef idx="1">
-            <a:schemeClr val="accent1"/>
-          </a:fillRef>
-          <a:effectRef idx="0">
-            <a:schemeClr val="accent1"/>
-          </a:effectRef>
-          <a:fontRef idx="minor">
-            <a:schemeClr val="lt1"/>
-          </a:fontRef>
-        </p:style>
-        <p:txBody>
-          <a:bodyPr rot="0" spcFirstLastPara="0" vertOverflow="overflow" horzOverflow="overflow" vert="horz" wrap="square" lIns="68580" tIns="34290" rIns="68580" bIns="34290" numCol="1" spcCol="0" rtlCol="0" fromWordArt="0" anchor="ctr" anchorCtr="0" forceAA="0" compatLnSpc="1">
-            <a:prstTxWarp prst="textNoShape">
-              <a:avLst/>
-            </a:prstTxWarp>
-            <a:noAutofit/>
-          </a:bodyPr>
-          <a:lstStyle/>
-          <a:p>
-            <a:pPr algn="ctr"/>
-            <a:endParaRPr lang="en-US" sz="1050" dirty="0">
-              <a:latin typeface="+mj-lt"/>
-            </a:endParaRPr>
-          </a:p>
-        </p:txBody>
-      </p:sp>
-      <p:cxnSp>
-        <p:nvCxnSpPr>
-          <p:cNvPr id="31" name="Straight Connector 30"/>
-          <p:cNvCxnSpPr/>
-          <p:nvPr/>
-        </p:nvCxnSpPr>
-        <p:spPr>
-          <a:xfrm flipH="1" flipV="1">
-            <a:off x="5164093" y="2154700"/>
-            <a:ext cx="350747" cy="294748"/>
-          </a:xfrm>
-          <a:prstGeom prst="line">
-            <a:avLst/>
-          </a:prstGeom>
-        </p:spPr>
-        <p:style>
-          <a:lnRef idx="1">
-            <a:schemeClr val="accent1"/>
-          </a:lnRef>
-          <a:fillRef idx="0">
-            <a:schemeClr val="accent1"/>
-          </a:fillRef>
-          <a:effectRef idx="0">
-            <a:schemeClr val="accent1"/>
-          </a:effectRef>
-          <a:fontRef idx="minor">
-            <a:schemeClr val="tx1"/>
-          </a:fontRef>
-        </p:style>
-      </p:cxnSp>
-      <p:cxnSp>
-        <p:nvCxnSpPr>
-          <p:cNvPr id="32" name="Straight Connector 31"/>
-          <p:cNvCxnSpPr>
-            <a:stCxn id="9" idx="2"/>
-          </p:cNvCxnSpPr>
-          <p:nvPr/>
-        </p:nvCxnSpPr>
-        <p:spPr>
-          <a:xfrm flipH="1" flipV="1">
-            <a:off x="5156379" y="3729084"/>
-            <a:ext cx="366176" cy="180597"/>
-          </a:xfrm>
-          <a:prstGeom prst="line">
-            <a:avLst/>
-          </a:prstGeom>
-        </p:spPr>
-        <p:style>
-          <a:lnRef idx="1">
-            <a:schemeClr val="accent1"/>
-          </a:lnRef>
-          <a:fillRef idx="0">
-            <a:schemeClr val="accent1"/>
-          </a:fillRef>
-          <a:effectRef idx="0">
-            <a:schemeClr val="accent1"/>
-          </a:effectRef>
-          <a:fontRef idx="minor">
-            <a:schemeClr val="tx1"/>
-          </a:fontRef>
-        </p:style>
-      </p:cxnSp>
-      <p:sp>
-        <p:nvSpPr>
-          <p:cNvPr id="33" name="TextBox 32"/>
-          <p:cNvSpPr txBox="1"/>
-          <p:nvPr/>
-        </p:nvSpPr>
-        <p:spPr>
-          <a:xfrm>
-            <a:off x="918079" y="4846315"/>
-            <a:ext cx="1737797" cy="323165"/>
-          </a:xfrm>
-          <a:prstGeom prst="rect">
-            <a:avLst/>
-          </a:prstGeom>
-          <a:noFill/>
-        </p:spPr>
-        <p:txBody>
-          <a:bodyPr wrap="square" rtlCol="0">
-            <a:spAutoFit/>
-          </a:bodyPr>
-          <a:lstStyle/>
-          <a:p>
-            <a:r>
-              <a:rPr lang="en-US" sz="750" i="1" dirty="0"/>
-              <a:t>Distinct (PK) on ride_source, locationID, and hour/day/month/year</a:t>
-            </a:r>
-          </a:p>
-        </p:txBody>
-      </p:sp>
-      <p:sp>
-        <p:nvSpPr>
-          <p:cNvPr id="34" name="TextBox 33"/>
-          <p:cNvSpPr txBox="1"/>
-          <p:nvPr/>
-        </p:nvSpPr>
-        <p:spPr>
-          <a:xfrm>
-            <a:off x="2286172" y="2355388"/>
-            <a:ext cx="1529978" cy="323165"/>
-          </a:xfrm>
-          <a:prstGeom prst="rect">
-            <a:avLst/>
-          </a:prstGeom>
-          <a:noFill/>
-        </p:spPr>
-        <p:txBody>
-          <a:bodyPr wrap="square" rtlCol="0">
-            <a:spAutoFit/>
-          </a:bodyPr>
-          <a:lstStyle/>
-          <a:p>
-            <a:r>
-              <a:rPr lang="en-US" sz="750" i="1" dirty="0">
-                <a:latin typeface="+mj-lt"/>
-              </a:rPr>
-              <a:t>Group on all fields (relative PK) and sum rides</a:t>
-            </a:r>
-          </a:p>
-        </p:txBody>
-      </p:sp>
+      </p:pic>
     </p:spTree>
     <p:extLst>
       <p:ext uri="{BB962C8B-B14F-4D97-AF65-F5344CB8AC3E}">
-        <p14:creationId xmlns:p14="http://schemas.microsoft.com/office/powerpoint/2010/main" val="231737528"/>
+        <p14:creationId xmlns:p14="http://schemas.microsoft.com/office/powerpoint/2010/main" val="895251369"/>
       </p:ext>
     </p:extLst>
   </p:cSld>

</xml_diff>

<commit_message>
added yellow cab training cost
</commit_message>
<xml_diff>
--- a/W205-TaxiNYC-FinalPresentation-JB-RN-AP.pptx
+++ b/W205-TaxiNYC-FinalPresentation-JB-RN-AP.pptx
@@ -5,7 +5,7 @@
     <p:sldMasterId id="2147483660" r:id="rId1"/>
   </p:sldMasterIdLst>
   <p:notesMasterIdLst>
-    <p:notesMasterId r:id="rId17"/>
+    <p:notesMasterId r:id="rId18"/>
   </p:notesMasterIdLst>
   <p:sldIdLst>
     <p:sldId id="256" r:id="rId2"/>
@@ -22,7 +22,8 @@
     <p:sldId id="259" r:id="rId13"/>
     <p:sldId id="260" r:id="rId14"/>
     <p:sldId id="290" r:id="rId15"/>
-    <p:sldId id="265" r:id="rId16"/>
+    <p:sldId id="292" r:id="rId16"/>
+    <p:sldId id="265" r:id="rId17"/>
   </p:sldIdLst>
   <p:sldSz cx="9144000" cy="5143500" type="screen16x9"/>
   <p:notesSz cx="6858000" cy="9144000"/>
@@ -789,6 +790,103 @@
 </file>
 
 <file path=ppt/notesSlides/notesSlide12.xml><?xml version="1.0" encoding="utf-8"?>
+<p:notes xmlns:a="http://schemas.openxmlformats.org/drawingml/2006/main" xmlns:r="http://schemas.openxmlformats.org/officeDocument/2006/relationships" xmlns:p="http://schemas.openxmlformats.org/presentationml/2006/main" showMasterSp="0" showMasterPhAnim="0">
+  <p:cSld>
+    <p:spTree>
+      <p:nvGrpSpPr>
+        <p:cNvPr id="1" name=""/>
+        <p:cNvGrpSpPr/>
+        <p:nvPr/>
+      </p:nvGrpSpPr>
+      <p:grpSpPr>
+        <a:xfrm>
+          <a:off x="0" y="0"/>
+          <a:ext cx="0" cy="0"/>
+          <a:chOff x="0" y="0"/>
+          <a:chExt cx="0" cy="0"/>
+        </a:xfrm>
+      </p:grpSpPr>
+      <p:sp>
+        <p:nvSpPr>
+          <p:cNvPr id="27650" name="Shape 118"/>
+          <p:cNvSpPr txBox="1">
+            <a:spLocks noGrp="1"/>
+          </p:cNvSpPr>
+          <p:nvPr>
+            <p:ph type="body" idx="1"/>
+          </p:nvPr>
+        </p:nvSpPr>
+        <p:spPr bwMode="auto">
+          <a:noFill/>
+          <a:extLst>
+            <a:ext uri="{909E8E84-426E-40DD-AFC4-6F175D3DCCD1}">
+              <a14:hiddenFill xmlns:a14="http://schemas.microsoft.com/office/drawing/2010/main">
+                <a:solidFill>
+                  <a:srgbClr val="FFFFFF"/>
+                </a:solidFill>
+              </a14:hiddenFill>
+            </a:ext>
+            <a:ext uri="{91240B29-F687-4F45-9708-019B960494DF}">
+              <a14:hiddenLine xmlns:a14="http://schemas.microsoft.com/office/drawing/2010/main" w="9525">
+                <a:solidFill>
+                  <a:srgbClr val="000000"/>
+                </a:solidFill>
+                <a:miter lim="800000"/>
+                <a:headEnd/>
+                <a:tailEnd/>
+              </a14:hiddenLine>
+            </a:ext>
+          </a:extLst>
+        </p:spPr>
+        <p:txBody>
+          <a:bodyPr vert="horz" wrap="square" numCol="1" anchor="ctr" compatLnSpc="1">
+            <a:prstTxWarp prst="textNoShape">
+              <a:avLst/>
+            </a:prstTxWarp>
+          </a:bodyPr>
+          <a:lstStyle/>
+          <a:p>
+            <a:pPr>
+              <a:spcBef>
+                <a:spcPct val="0"/>
+              </a:spcBef>
+            </a:pPr>
+            <a:endParaRPr lang="en-US" altLang="en-US" dirty="0"/>
+          </a:p>
+        </p:txBody>
+      </p:sp>
+      <p:sp>
+        <p:nvSpPr>
+          <p:cNvPr id="27651" name="Shape 119"/>
+          <p:cNvSpPr>
+            <a:spLocks noGrp="1" noRot="1" noChangeAspect="1" noTextEdit="1"/>
+          </p:cNvSpPr>
+          <p:nvPr>
+            <p:ph type="sldImg" idx="2"/>
+          </p:nvPr>
+        </p:nvSpPr>
+        <p:spPr>
+          <a:noFill/>
+          <a:ln>
+            <a:headEnd/>
+            <a:tailEnd/>
+          </a:ln>
+        </p:spPr>
+      </p:sp>
+    </p:spTree>
+    <p:extLst>
+      <p:ext uri="{BB962C8B-B14F-4D97-AF65-F5344CB8AC3E}">
+        <p14:creationId xmlns:p14="http://schemas.microsoft.com/office/powerpoint/2010/main" val="1306625315"/>
+      </p:ext>
+    </p:extLst>
+  </p:cSld>
+  <p:clrMapOvr>
+    <a:masterClrMapping/>
+  </p:clrMapOvr>
+</p:notes>
+</file>
+
+<file path=ppt/notesSlides/notesSlide13.xml><?xml version="1.0" encoding="utf-8"?>
 <p:notes xmlns:a="http://schemas.openxmlformats.org/drawingml/2006/main" xmlns:r="http://schemas.openxmlformats.org/officeDocument/2006/relationships" xmlns:p="http://schemas.openxmlformats.org/presentationml/2006/main" showMasterSp="0" showMasterPhAnim="0">
   <p:cSld>
     <p:spTree>
@@ -13667,6 +13765,260 @@
       </p:sp>
       <p:pic>
         <p:nvPicPr>
+          <p:cNvPr id="2" name="Picture 1"/>
+          <p:cNvPicPr>
+            <a:picLocks noChangeAspect="1"/>
+          </p:cNvPicPr>
+          <p:nvPr/>
+        </p:nvPicPr>
+        <p:blipFill>
+          <a:blip r:embed="rId3"/>
+          <a:stretch>
+            <a:fillRect/>
+          </a:stretch>
+        </p:blipFill>
+        <p:spPr>
+          <a:xfrm>
+            <a:off x="1052944" y="823083"/>
+            <a:ext cx="7256827" cy="4320417"/>
+          </a:xfrm>
+          <a:prstGeom prst="rect">
+            <a:avLst/>
+          </a:prstGeom>
+        </p:spPr>
+      </p:pic>
+    </p:spTree>
+    <p:extLst>
+      <p:ext uri="{BB962C8B-B14F-4D97-AF65-F5344CB8AC3E}">
+        <p14:creationId xmlns:p14="http://schemas.microsoft.com/office/powerpoint/2010/main" val="895251369"/>
+      </p:ext>
+    </p:extLst>
+  </p:cSld>
+  <p:clrMapOvr>
+    <a:masterClrMapping/>
+  </p:clrMapOvr>
+</p:sld>
+</file>
+
+<file path=ppt/slides/slide15.xml><?xml version="1.0" encoding="utf-8"?>
+<p:sld xmlns:a="http://schemas.openxmlformats.org/drawingml/2006/main" xmlns:r="http://schemas.openxmlformats.org/officeDocument/2006/relationships" xmlns:p="http://schemas.openxmlformats.org/presentationml/2006/main">
+  <p:cSld>
+    <p:spTree>
+      <p:nvGrpSpPr>
+        <p:cNvPr id="1" name=""/>
+        <p:cNvGrpSpPr/>
+        <p:nvPr/>
+      </p:nvGrpSpPr>
+      <p:grpSpPr>
+        <a:xfrm>
+          <a:off x="0" y="0"/>
+          <a:ext cx="0" cy="0"/>
+          <a:chOff x="0" y="0"/>
+          <a:chExt cx="0" cy="0"/>
+        </a:xfrm>
+      </p:grpSpPr>
+      <p:sp>
+        <p:nvSpPr>
+          <p:cNvPr id="26626" name="Shape 121"/>
+          <p:cNvSpPr>
+            <a:spLocks noChangeArrowheads="1"/>
+          </p:cNvSpPr>
+          <p:nvPr/>
+        </p:nvSpPr>
+        <p:spPr bwMode="auto">
+          <a:xfrm>
+            <a:off x="4763" y="815975"/>
+            <a:ext cx="9144000" cy="4327525"/>
+          </a:xfrm>
+          <a:prstGeom prst="rect">
+            <a:avLst/>
+          </a:prstGeom>
+          <a:solidFill>
+            <a:schemeClr val="bg1"/>
+          </a:solidFill>
+          <a:ln w="9525">
+            <a:solidFill>
+              <a:schemeClr val="bg2"/>
+            </a:solidFill>
+            <a:round/>
+            <a:headEnd/>
+            <a:tailEnd/>
+          </a:ln>
+        </p:spPr>
+        <p:txBody>
+          <a:bodyPr lIns="91425" tIns="91425" rIns="91425" bIns="91425" anchor="ctr"/>
+          <a:lstStyle>
+            <a:lvl1pPr>
+              <a:defRPr sz="1400">
+                <a:solidFill>
+                  <a:srgbClr val="000000"/>
+                </a:solidFill>
+                <a:latin typeface="Arial" panose="020B0604020202020204" pitchFamily="34" charset="0"/>
+                <a:cs typeface="Arial" panose="020B0604020202020204" pitchFamily="34" charset="0"/>
+                <a:sym typeface="Arial" panose="020B0604020202020204" pitchFamily="34" charset="0"/>
+              </a:defRPr>
+            </a:lvl1pPr>
+            <a:lvl2pPr marL="742950" indent="-285750">
+              <a:defRPr sz="1400">
+                <a:solidFill>
+                  <a:srgbClr val="000000"/>
+                </a:solidFill>
+                <a:latin typeface="Arial" panose="020B0604020202020204" pitchFamily="34" charset="0"/>
+                <a:cs typeface="Arial" panose="020B0604020202020204" pitchFamily="34" charset="0"/>
+                <a:sym typeface="Arial" panose="020B0604020202020204" pitchFamily="34" charset="0"/>
+              </a:defRPr>
+            </a:lvl2pPr>
+            <a:lvl3pPr marL="1143000" indent="-228600">
+              <a:defRPr sz="1400">
+                <a:solidFill>
+                  <a:srgbClr val="000000"/>
+                </a:solidFill>
+                <a:latin typeface="Arial" panose="020B0604020202020204" pitchFamily="34" charset="0"/>
+                <a:cs typeface="Arial" panose="020B0604020202020204" pitchFamily="34" charset="0"/>
+                <a:sym typeface="Arial" panose="020B0604020202020204" pitchFamily="34" charset="0"/>
+              </a:defRPr>
+            </a:lvl3pPr>
+            <a:lvl4pPr marL="1600200" indent="-228600">
+              <a:defRPr sz="1400">
+                <a:solidFill>
+                  <a:srgbClr val="000000"/>
+                </a:solidFill>
+                <a:latin typeface="Arial" panose="020B0604020202020204" pitchFamily="34" charset="0"/>
+                <a:cs typeface="Arial" panose="020B0604020202020204" pitchFamily="34" charset="0"/>
+                <a:sym typeface="Arial" panose="020B0604020202020204" pitchFamily="34" charset="0"/>
+              </a:defRPr>
+            </a:lvl4pPr>
+            <a:lvl5pPr marL="2057400" indent="-228600">
+              <a:defRPr sz="1400">
+                <a:solidFill>
+                  <a:srgbClr val="000000"/>
+                </a:solidFill>
+                <a:latin typeface="Arial" panose="020B0604020202020204" pitchFamily="34" charset="0"/>
+                <a:cs typeface="Arial" panose="020B0604020202020204" pitchFamily="34" charset="0"/>
+                <a:sym typeface="Arial" panose="020B0604020202020204" pitchFamily="34" charset="0"/>
+              </a:defRPr>
+            </a:lvl5pPr>
+            <a:lvl6pPr marL="2514600" indent="-228600" eaLnBrk="0" fontAlgn="base" hangingPunct="0">
+              <a:spcBef>
+                <a:spcPct val="0"/>
+              </a:spcBef>
+              <a:spcAft>
+                <a:spcPct val="0"/>
+              </a:spcAft>
+              <a:defRPr sz="1400">
+                <a:solidFill>
+                  <a:srgbClr val="000000"/>
+                </a:solidFill>
+                <a:latin typeface="Arial" panose="020B0604020202020204" pitchFamily="34" charset="0"/>
+                <a:cs typeface="Arial" panose="020B0604020202020204" pitchFamily="34" charset="0"/>
+                <a:sym typeface="Arial" panose="020B0604020202020204" pitchFamily="34" charset="0"/>
+              </a:defRPr>
+            </a:lvl6pPr>
+            <a:lvl7pPr marL="2971800" indent="-228600" eaLnBrk="0" fontAlgn="base" hangingPunct="0">
+              <a:spcBef>
+                <a:spcPct val="0"/>
+              </a:spcBef>
+              <a:spcAft>
+                <a:spcPct val="0"/>
+              </a:spcAft>
+              <a:defRPr sz="1400">
+                <a:solidFill>
+                  <a:srgbClr val="000000"/>
+                </a:solidFill>
+                <a:latin typeface="Arial" panose="020B0604020202020204" pitchFamily="34" charset="0"/>
+                <a:cs typeface="Arial" panose="020B0604020202020204" pitchFamily="34" charset="0"/>
+                <a:sym typeface="Arial" panose="020B0604020202020204" pitchFamily="34" charset="0"/>
+              </a:defRPr>
+            </a:lvl7pPr>
+            <a:lvl8pPr marL="3429000" indent="-228600" eaLnBrk="0" fontAlgn="base" hangingPunct="0">
+              <a:spcBef>
+                <a:spcPct val="0"/>
+              </a:spcBef>
+              <a:spcAft>
+                <a:spcPct val="0"/>
+              </a:spcAft>
+              <a:defRPr sz="1400">
+                <a:solidFill>
+                  <a:srgbClr val="000000"/>
+                </a:solidFill>
+                <a:latin typeface="Arial" panose="020B0604020202020204" pitchFamily="34" charset="0"/>
+                <a:cs typeface="Arial" panose="020B0604020202020204" pitchFamily="34" charset="0"/>
+                <a:sym typeface="Arial" panose="020B0604020202020204" pitchFamily="34" charset="0"/>
+              </a:defRPr>
+            </a:lvl8pPr>
+            <a:lvl9pPr marL="3886200" indent="-228600" eaLnBrk="0" fontAlgn="base" hangingPunct="0">
+              <a:spcBef>
+                <a:spcPct val="0"/>
+              </a:spcBef>
+              <a:spcAft>
+                <a:spcPct val="0"/>
+              </a:spcAft>
+              <a:defRPr sz="1400">
+                <a:solidFill>
+                  <a:srgbClr val="000000"/>
+                </a:solidFill>
+                <a:latin typeface="Arial" panose="020B0604020202020204" pitchFamily="34" charset="0"/>
+                <a:cs typeface="Arial" panose="020B0604020202020204" pitchFamily="34" charset="0"/>
+                <a:sym typeface="Arial" panose="020B0604020202020204" pitchFamily="34" charset="0"/>
+              </a:defRPr>
+            </a:lvl9pPr>
+          </a:lstStyle>
+          <a:p>
+            <a:pPr eaLnBrk="1" hangingPunct="1"/>
+            <a:endParaRPr lang="en-US" altLang="en-US" dirty="0"/>
+          </a:p>
+        </p:txBody>
+      </p:sp>
+      <p:sp>
+        <p:nvSpPr>
+          <p:cNvPr id="26627" name="Shape 122"/>
+          <p:cNvSpPr txBox="1">
+            <a:spLocks noGrp="1"/>
+          </p:cNvSpPr>
+          <p:nvPr>
+            <p:ph type="title"/>
+          </p:nvPr>
+        </p:nvSpPr>
+        <p:spPr>
+          <a:xfrm>
+            <a:off x="0" y="26988"/>
+            <a:ext cx="7543800" cy="685800"/>
+          </a:xfrm>
+        </p:spPr>
+        <p:txBody>
+          <a:bodyPr/>
+          <a:lstStyle/>
+          <a:p>
+            <a:pPr eaLnBrk="1" hangingPunct="1">
+              <a:spcBef>
+                <a:spcPct val="0"/>
+              </a:spcBef>
+              <a:spcAft>
+                <a:spcPct val="0"/>
+              </a:spcAft>
+              <a:buClr>
+                <a:srgbClr val="FFFFFF"/>
+              </a:buClr>
+              <a:buSzPct val="25000"/>
+              <a:buFont typeface="Times New Roman" panose="02020603050405020304" pitchFamily="18" charset="0"/>
+              <a:buNone/>
+            </a:pPr>
+            <a:r>
+              <a:rPr lang="en-US" altLang="en-US" dirty="0">
+                <a:solidFill>
+                  <a:srgbClr val="FFFFFF"/>
+                </a:solidFill>
+                <a:latin typeface="+mj-lt"/>
+                <a:cs typeface="Helvetica Neue" charset="0"/>
+                <a:sym typeface="Helvetica Neue" charset="0"/>
+              </a:rPr>
+              <a:t>Training the Prediction Model</a:t>
+            </a:r>
+          </a:p>
+        </p:txBody>
+      </p:sp>
+      <p:pic>
+        <p:nvPicPr>
           <p:cNvPr id="16" name="Picture 15"/>
           <p:cNvPicPr>
             <a:picLocks noChangeAspect="1"/>
@@ -13692,7 +14044,7 @@
     </p:spTree>
     <p:extLst>
       <p:ext uri="{BB962C8B-B14F-4D97-AF65-F5344CB8AC3E}">
-        <p14:creationId xmlns:p14="http://schemas.microsoft.com/office/powerpoint/2010/main" val="895251369"/>
+        <p14:creationId xmlns:p14="http://schemas.microsoft.com/office/powerpoint/2010/main" val="3388017991"/>
       </p:ext>
     </p:extLst>
   </p:cSld>
@@ -13702,7 +14054,7 @@
 </p:sld>
 </file>
 
-<file path=ppt/slides/slide15.xml><?xml version="1.0" encoding="utf-8"?>
+<file path=ppt/slides/slide16.xml><?xml version="1.0" encoding="utf-8"?>
 <p:sld xmlns:a="http://schemas.openxmlformats.org/drawingml/2006/main" xmlns:r="http://schemas.openxmlformats.org/officeDocument/2006/relationships" xmlns:p="http://schemas.openxmlformats.org/presentationml/2006/main">
   <p:cSld>
     <p:spTree>

</xml_diff>